<commit_message>
Added javaDocs for war and updated the proposal.pptx
</commit_message>
<xml_diff>
--- a/Applications Proposal.pptx
+++ b/Applications Proposal.pptx
@@ -5,7 +5,7 @@
     <p:sldMasterId id="2147483659" r:id="rId1"/>
   </p:sldMasterIdLst>
   <p:notesMasterIdLst>
-    <p:notesMasterId r:id="rId7"/>
+    <p:notesMasterId r:id="rId8"/>
   </p:notesMasterIdLst>
   <p:sldIdLst>
     <p:sldId id="256" r:id="rId2"/>
@@ -13,6 +13,7 @@
     <p:sldId id="258" r:id="rId4"/>
     <p:sldId id="259" r:id="rId5"/>
     <p:sldId id="260" r:id="rId6"/>
+    <p:sldId id="261" r:id="rId7"/>
   </p:sldIdLst>
   <p:sldSz cx="9144000" cy="5143500" type="screen16x9"/>
   <p:notesSz cx="6858000" cy="9144000"/>
@@ -431,6 +432,11 @@
         </p:txBody>
       </p:sp>
     </p:spTree>
+    <p:extLst>
+      <p:ext uri="{BB962C8B-B14F-4D97-AF65-F5344CB8AC3E}">
+        <p14:creationId xmlns:p14="http://schemas.microsoft.com/office/powerpoint/2010/main" val="902352228"/>
+      </p:ext>
+    </p:extLst>
   </p:cSld>
   <p:clrMap bg1="lt1" tx1="dk1" bg2="dk2" tx2="lt2" accent1="accent1" accent2="accent2" accent3="accent3" accent4="accent4" accent5="accent5" accent6="accent6" hlink="hlink" folHlink="folHlink"/>
   <p:notesStyle>
@@ -625,6 +631,11 @@
         </p:txBody>
       </p:sp>
     </p:spTree>
+    <p:extLst>
+      <p:ext uri="{BB962C8B-B14F-4D97-AF65-F5344CB8AC3E}">
+        <p14:creationId xmlns:p14="http://schemas.microsoft.com/office/powerpoint/2010/main" val="4293052328"/>
+      </p:ext>
+    </p:extLst>
   </p:cSld>
   <p:clrMapOvr>
     <a:masterClrMapping/>
@@ -729,6 +740,11 @@
         </p:txBody>
       </p:sp>
     </p:spTree>
+    <p:extLst>
+      <p:ext uri="{BB962C8B-B14F-4D97-AF65-F5344CB8AC3E}">
+        <p14:creationId xmlns:p14="http://schemas.microsoft.com/office/powerpoint/2010/main" val="1782700122"/>
+      </p:ext>
+    </p:extLst>
   </p:cSld>
   <p:clrMapOvr>
     <a:masterClrMapping/>
@@ -833,6 +849,11 @@
         </p:txBody>
       </p:sp>
     </p:spTree>
+    <p:extLst>
+      <p:ext uri="{BB962C8B-B14F-4D97-AF65-F5344CB8AC3E}">
+        <p14:creationId xmlns:p14="http://schemas.microsoft.com/office/powerpoint/2010/main" val="1570773092"/>
+      </p:ext>
+    </p:extLst>
   </p:cSld>
   <p:clrMapOvr>
     <a:masterClrMapping/>
@@ -937,6 +958,11 @@
         </p:txBody>
       </p:sp>
     </p:spTree>
+    <p:extLst>
+      <p:ext uri="{BB962C8B-B14F-4D97-AF65-F5344CB8AC3E}">
+        <p14:creationId xmlns:p14="http://schemas.microsoft.com/office/powerpoint/2010/main" val="1289183521"/>
+      </p:ext>
+    </p:extLst>
   </p:cSld>
   <p:clrMapOvr>
     <a:masterClrMapping/>
@@ -1044,6 +1070,115 @@
     <p:extLst>
       <p:ext uri="{BB962C8B-B14F-4D97-AF65-F5344CB8AC3E}">
         <p14:creationId xmlns:p14="http://schemas.microsoft.com/office/powerpoint/2010/main" val="805943878"/>
+      </p:ext>
+    </p:extLst>
+  </p:cSld>
+  <p:clrMapOvr>
+    <a:masterClrMapping/>
+  </p:clrMapOvr>
+</p:notes>
+</file>
+
+<file path=ppt/notesSlides/notesSlide6.xml><?xml version="1.0" encoding="utf-8"?>
+<p:notes xmlns:a="http://schemas.openxmlformats.org/drawingml/2006/main" xmlns:r="http://schemas.openxmlformats.org/officeDocument/2006/relationships" xmlns:p="http://schemas.openxmlformats.org/presentationml/2006/main" showMasterSp="0" showMasterPhAnim="0">
+  <p:cSld>
+    <p:spTree>
+      <p:nvGrpSpPr>
+        <p:cNvPr id="1" name="Shape 88"/>
+        <p:cNvGrpSpPr/>
+        <p:nvPr/>
+      </p:nvGrpSpPr>
+      <p:grpSpPr>
+        <a:xfrm>
+          <a:off x="0" y="0"/>
+          <a:ext cx="0" cy="0"/>
+          <a:chOff x="0" y="0"/>
+          <a:chExt cx="0" cy="0"/>
+        </a:xfrm>
+      </p:grpSpPr>
+      <p:sp>
+        <p:nvSpPr>
+          <p:cNvPr id="89" name="Shape 89"/>
+          <p:cNvSpPr>
+            <a:spLocks noGrp="1" noRot="1" noChangeAspect="1"/>
+          </p:cNvSpPr>
+          <p:nvPr>
+            <p:ph type="sldImg" idx="2"/>
+          </p:nvPr>
+        </p:nvSpPr>
+        <p:spPr>
+          <a:xfrm>
+            <a:off x="381000" y="685800"/>
+            <a:ext cx="6096000" cy="3429000"/>
+          </a:xfrm>
+          <a:custGeom>
+            <a:avLst/>
+            <a:gdLst/>
+            <a:ahLst/>
+            <a:cxnLst/>
+            <a:rect l="0" t="0" r="0" b="0"/>
+            <a:pathLst>
+              <a:path w="120000" h="120000" extrusionOk="0">
+                <a:moveTo>
+                  <a:pt x="0" y="0"/>
+                </a:moveTo>
+                <a:lnTo>
+                  <a:pt x="120000" y="0"/>
+                </a:lnTo>
+                <a:lnTo>
+                  <a:pt x="120000" y="120000"/>
+                </a:lnTo>
+                <a:lnTo>
+                  <a:pt x="0" y="120000"/>
+                </a:lnTo>
+                <a:close/>
+              </a:path>
+            </a:pathLst>
+          </a:custGeom>
+        </p:spPr>
+      </p:sp>
+      <p:sp>
+        <p:nvSpPr>
+          <p:cNvPr id="90" name="Shape 90"/>
+          <p:cNvSpPr txBox="1">
+            <a:spLocks noGrp="1"/>
+          </p:cNvSpPr>
+          <p:nvPr>
+            <p:ph type="body" idx="1"/>
+          </p:nvPr>
+        </p:nvSpPr>
+        <p:spPr>
+          <a:xfrm>
+            <a:off x="685800" y="4343400"/>
+            <a:ext cx="5486400" cy="4114800"/>
+          </a:xfrm>
+          <a:prstGeom prst="rect">
+            <a:avLst/>
+          </a:prstGeom>
+        </p:spPr>
+        <p:txBody>
+          <a:bodyPr spcFirstLastPara="1" wrap="square" lIns="91425" tIns="91425" rIns="91425" bIns="91425" anchor="t" anchorCtr="0">
+            <a:noAutofit/>
+          </a:bodyPr>
+          <a:lstStyle/>
+          <a:p>
+            <a:pPr marL="0" lvl="0" indent="0" rtl="0">
+              <a:spcBef>
+                <a:spcPts val="0"/>
+              </a:spcBef>
+              <a:spcAft>
+                <a:spcPts val="0"/>
+              </a:spcAft>
+              <a:buNone/>
+            </a:pPr>
+            <a:endParaRPr/>
+          </a:p>
+        </p:txBody>
+      </p:sp>
+    </p:spTree>
+    <p:extLst>
+      <p:ext uri="{BB962C8B-B14F-4D97-AF65-F5344CB8AC3E}">
+        <p14:creationId xmlns:p14="http://schemas.microsoft.com/office/powerpoint/2010/main" val="4222755145"/>
       </p:ext>
     </p:extLst>
   </p:cSld>
@@ -5728,7 +5863,23 @@
             </a:r>
             <a:r>
               <a:rPr lang="en-US" dirty="0"/>
-              <a:t>The Hit Me or Hit Them application is used for entertainment for single players only. The player has the choice of playing one of two card games, Slapjack or War.</a:t>
+              <a:t>The Hit Me or Hit Them application is used for entertainment for single players only. The player has the choice of playing one </a:t>
+            </a:r>
+            <a:r>
+              <a:rPr lang="en-US" dirty="0" smtClean="0"/>
+              <a:t>of four </a:t>
+            </a:r>
+            <a:r>
+              <a:rPr lang="en-US" dirty="0"/>
+              <a:t>card games, </a:t>
+            </a:r>
+            <a:r>
+              <a:rPr lang="en-US" dirty="0" smtClean="0"/>
+              <a:t>Slapjack, Beggar My Neighbor, Poker </a:t>
+            </a:r>
+            <a:r>
+              <a:rPr lang="en-US" dirty="0"/>
+              <a:t>or War.</a:t>
             </a:r>
             <a:endParaRPr dirty="0"/>
           </a:p>
@@ -6112,7 +6263,7 @@
           <p:cNvPr id="2" name="Picture 1">
             <a:extLst>
               <a:ext uri="{FF2B5EF4-FFF2-40B4-BE49-F238E27FC236}">
-                <a16:creationId xmlns:a16="http://schemas.microsoft.com/office/drawing/2014/main" id="{D8D6BB6F-BC70-43AB-87D5-10974237D473}"/>
+                <a16:creationId xmlns:a16="http://schemas.microsoft.com/office/drawing/2014/main" xmlns="" id="{D8D6BB6F-BC70-43AB-87D5-10974237D473}"/>
               </a:ext>
             </a:extLst>
           </p:cNvPr>
@@ -6351,7 +6502,7 @@
           <p:cNvPr id="4" name="Picture 3" descr="A screenshot of a cell phone&#10;&#10;Description automatically generated">
             <a:extLst>
               <a:ext uri="{FF2B5EF4-FFF2-40B4-BE49-F238E27FC236}">
-                <a16:creationId xmlns:a16="http://schemas.microsoft.com/office/drawing/2014/main" id="{EBFDA3A1-C9F6-475C-AA9E-5E93005E2DF4}"/>
+                <a16:creationId xmlns:a16="http://schemas.microsoft.com/office/drawing/2014/main" xmlns="" id="{EBFDA3A1-C9F6-475C-AA9E-5E93005E2DF4}"/>
               </a:ext>
             </a:extLst>
           </p:cNvPr>
@@ -6381,7 +6532,7 @@
           <p:cNvPr id="7" name="Picture 6" descr="A screenshot of a cell phone&#10;&#10;Description automatically generated">
             <a:extLst>
               <a:ext uri="{FF2B5EF4-FFF2-40B4-BE49-F238E27FC236}">
-                <a16:creationId xmlns:a16="http://schemas.microsoft.com/office/drawing/2014/main" id="{BCB12E2A-CEE2-4768-B165-F4DF193FA314}"/>
+                <a16:creationId xmlns:a16="http://schemas.microsoft.com/office/drawing/2014/main" xmlns="" id="{BCB12E2A-CEE2-4768-B165-F4DF193FA314}"/>
               </a:ext>
             </a:extLst>
           </p:cNvPr>
@@ -6411,7 +6562,7 @@
           <p:cNvPr id="9" name="TextBox 8">
             <a:extLst>
               <a:ext uri="{FF2B5EF4-FFF2-40B4-BE49-F238E27FC236}">
-                <a16:creationId xmlns:a16="http://schemas.microsoft.com/office/drawing/2014/main" id="{BB23F1F2-7CD8-45E1-9BFC-436D062E5308}"/>
+                <a16:creationId xmlns:a16="http://schemas.microsoft.com/office/drawing/2014/main" xmlns="" id="{BB23F1F2-7CD8-45E1-9BFC-436D062E5308}"/>
               </a:ext>
             </a:extLst>
           </p:cNvPr>
@@ -6675,7 +6826,7 @@
           <p:cNvPr id="4" name="Picture 3" descr="A screenshot of a cell phone&#10;&#10;Description automatically generated">
             <a:extLst>
               <a:ext uri="{FF2B5EF4-FFF2-40B4-BE49-F238E27FC236}">
-                <a16:creationId xmlns:a16="http://schemas.microsoft.com/office/drawing/2014/main" id="{C93F3D5E-FB8B-4007-8B37-2B6CDFCBCF04}"/>
+                <a16:creationId xmlns:a16="http://schemas.microsoft.com/office/drawing/2014/main" xmlns="" id="{C93F3D5E-FB8B-4007-8B37-2B6CDFCBCF04}"/>
               </a:ext>
             </a:extLst>
           </p:cNvPr>
@@ -6705,7 +6856,7 @@
           <p:cNvPr id="7" name="Picture 6" descr="A screenshot of a cell phone&#10;&#10;Description automatically generated">
             <a:extLst>
               <a:ext uri="{FF2B5EF4-FFF2-40B4-BE49-F238E27FC236}">
-                <a16:creationId xmlns:a16="http://schemas.microsoft.com/office/drawing/2014/main" id="{C0FC98AF-49A4-4005-9472-EEA6BC73DAB7}"/>
+                <a16:creationId xmlns:a16="http://schemas.microsoft.com/office/drawing/2014/main" xmlns="" id="{C0FC98AF-49A4-4005-9472-EEA6BC73DAB7}"/>
               </a:ext>
             </a:extLst>
           </p:cNvPr>
@@ -6734,6 +6885,288 @@
     <p:extLst>
       <p:ext uri="{BB962C8B-B14F-4D97-AF65-F5344CB8AC3E}">
         <p14:creationId xmlns:p14="http://schemas.microsoft.com/office/powerpoint/2010/main" val="1156530784"/>
+      </p:ext>
+    </p:extLst>
+  </p:cSld>
+  <p:clrMapOvr>
+    <a:masterClrMapping/>
+  </p:clrMapOvr>
+</p:sld>
+</file>
+
+<file path=ppt/slides/slide6.xml><?xml version="1.0" encoding="utf-8"?>
+<p:sld xmlns:a="http://schemas.openxmlformats.org/drawingml/2006/main" xmlns:r="http://schemas.openxmlformats.org/officeDocument/2006/relationships" xmlns:p="http://schemas.openxmlformats.org/presentationml/2006/main">
+  <p:cSld>
+    <p:spTree>
+      <p:nvGrpSpPr>
+        <p:cNvPr id="1" name="Shape 91"/>
+        <p:cNvGrpSpPr/>
+        <p:nvPr/>
+      </p:nvGrpSpPr>
+      <p:grpSpPr>
+        <a:xfrm>
+          <a:off x="0" y="0"/>
+          <a:ext cx="0" cy="0"/>
+          <a:chOff x="0" y="0"/>
+          <a:chExt cx="0" cy="0"/>
+        </a:xfrm>
+      </p:grpSpPr>
+      <p:sp>
+        <p:nvSpPr>
+          <p:cNvPr id="92" name="Shape 92"/>
+          <p:cNvSpPr txBox="1">
+            <a:spLocks noGrp="1"/>
+          </p:cNvSpPr>
+          <p:nvPr>
+            <p:ph type="title"/>
+          </p:nvPr>
+        </p:nvSpPr>
+        <p:spPr>
+          <a:xfrm>
+            <a:off x="311700" y="445025"/>
+            <a:ext cx="8520600" cy="572700"/>
+          </a:xfrm>
+          <a:prstGeom prst="rect">
+            <a:avLst/>
+          </a:prstGeom>
+        </p:spPr>
+        <p:txBody>
+          <a:bodyPr spcFirstLastPara="1" wrap="square" lIns="91425" tIns="91425" rIns="91425" bIns="91425" anchor="t" anchorCtr="0">
+            <a:noAutofit/>
+          </a:bodyPr>
+          <a:lstStyle/>
+          <a:p>
+            <a:pPr marL="0" lvl="0" indent="0" rtl="0">
+              <a:spcBef>
+                <a:spcPts val="0"/>
+              </a:spcBef>
+              <a:spcAft>
+                <a:spcPts val="0"/>
+              </a:spcAft>
+              <a:buNone/>
+            </a:pPr>
+            <a:r>
+              <a:rPr lang="en"/>
+              <a:t>User Interface Design</a:t>
+            </a:r>
+            <a:endParaRPr/>
+          </a:p>
+        </p:txBody>
+      </p:sp>
+      <p:sp>
+        <p:nvSpPr>
+          <p:cNvPr id="93" name="Shape 93"/>
+          <p:cNvSpPr txBox="1">
+            <a:spLocks noGrp="1"/>
+          </p:cNvSpPr>
+          <p:nvPr>
+            <p:ph type="body" idx="1"/>
+          </p:nvPr>
+        </p:nvSpPr>
+        <p:spPr>
+          <a:xfrm>
+            <a:off x="311700" y="1152475"/>
+            <a:ext cx="8520600" cy="453300"/>
+          </a:xfrm>
+          <a:prstGeom prst="rect">
+            <a:avLst/>
+          </a:prstGeom>
+        </p:spPr>
+        <p:txBody>
+          <a:bodyPr spcFirstLastPara="1" wrap="square" lIns="91425" tIns="91425" rIns="91425" bIns="91425" anchor="t" anchorCtr="0">
+            <a:noAutofit/>
+          </a:bodyPr>
+          <a:lstStyle/>
+          <a:p>
+            <a:pPr marL="0" lvl="0" indent="0" rtl="0">
+              <a:spcBef>
+                <a:spcPts val="0"/>
+              </a:spcBef>
+              <a:spcAft>
+                <a:spcPts val="1600"/>
+              </a:spcAft>
+              <a:buNone/>
+            </a:pPr>
+            <a:r>
+              <a:rPr lang="en-US" sz="1200" dirty="0" smtClean="0"/>
+              <a:t>Beggar </a:t>
+            </a:r>
+            <a:r>
+              <a:rPr lang="en-US" sz="1200" dirty="0" smtClean="0"/>
+              <a:t>My Neighbor </a:t>
+            </a:r>
+            <a:r>
+              <a:rPr lang="en-US" sz="1200" dirty="0" smtClean="0"/>
+              <a:t>GUI</a:t>
+            </a:r>
+            <a:endParaRPr sz="1200" dirty="0"/>
+          </a:p>
+        </p:txBody>
+      </p:sp>
+      <p:sp>
+        <p:nvSpPr>
+          <p:cNvPr id="94" name="Shape 94"/>
+          <p:cNvSpPr txBox="1"/>
+          <p:nvPr/>
+        </p:nvSpPr>
+        <p:spPr>
+          <a:xfrm>
+            <a:off x="6358200" y="4871700"/>
+            <a:ext cx="2785800" cy="271800"/>
+          </a:xfrm>
+          <a:prstGeom prst="rect">
+            <a:avLst/>
+          </a:prstGeom>
+          <a:noFill/>
+          <a:ln>
+            <a:noFill/>
+          </a:ln>
+        </p:spPr>
+        <p:txBody>
+          <a:bodyPr spcFirstLastPara="1" wrap="square" lIns="91425" tIns="91425" rIns="91425" bIns="91425" anchor="t" anchorCtr="0">
+            <a:noAutofit/>
+          </a:bodyPr>
+          <a:lstStyle/>
+          <a:p>
+            <a:pPr marL="0" lvl="0" indent="0" algn="r" rtl="0">
+              <a:spcBef>
+                <a:spcPts val="0"/>
+              </a:spcBef>
+              <a:spcAft>
+                <a:spcPts val="0"/>
+              </a:spcAft>
+              <a:buNone/>
+            </a:pPr>
+            <a:r>
+              <a:rPr lang="en-US" dirty="0">
+                <a:solidFill>
+                  <a:srgbClr val="B7B7B7"/>
+                </a:solidFill>
+              </a:rPr>
+              <a:t>MTM – Hit Me or Hit Them</a:t>
+            </a:r>
+            <a:endParaRPr dirty="0">
+              <a:solidFill>
+                <a:srgbClr val="B7B7B7"/>
+              </a:solidFill>
+            </a:endParaRPr>
+          </a:p>
+        </p:txBody>
+      </p:sp>
+      <p:sp>
+        <p:nvSpPr>
+          <p:cNvPr id="95" name="Shape 95"/>
+          <p:cNvSpPr txBox="1"/>
+          <p:nvPr/>
+        </p:nvSpPr>
+        <p:spPr>
+          <a:xfrm>
+            <a:off x="0" y="4871700"/>
+            <a:ext cx="2785800" cy="271800"/>
+          </a:xfrm>
+          <a:prstGeom prst="rect">
+            <a:avLst/>
+          </a:prstGeom>
+          <a:noFill/>
+          <a:ln>
+            <a:noFill/>
+          </a:ln>
+        </p:spPr>
+        <p:txBody>
+          <a:bodyPr spcFirstLastPara="1" wrap="square" lIns="91425" tIns="91425" rIns="91425" bIns="91425" anchor="t" anchorCtr="0">
+            <a:noAutofit/>
+          </a:bodyPr>
+          <a:lstStyle/>
+          <a:p>
+            <a:pPr marL="0" lvl="0" indent="0" rtl="0">
+              <a:spcBef>
+                <a:spcPts val="0"/>
+              </a:spcBef>
+              <a:spcAft>
+                <a:spcPts val="0"/>
+              </a:spcAft>
+              <a:buNone/>
+            </a:pPr>
+            <a:r>
+              <a:rPr lang="en" dirty="0">
+                <a:solidFill>
+                  <a:srgbClr val="B7B7B7"/>
+                </a:solidFill>
+              </a:rPr>
+              <a:t>UTSA CS 3443 - 003</a:t>
+            </a:r>
+            <a:endParaRPr dirty="0">
+              <a:solidFill>
+                <a:srgbClr val="B7B7B7"/>
+              </a:solidFill>
+            </a:endParaRPr>
+          </a:p>
+        </p:txBody>
+      </p:sp>
+      <p:pic>
+        <p:nvPicPr>
+          <p:cNvPr id="2" name="Picture 1"/>
+          <p:cNvPicPr>
+            <a:picLocks noChangeAspect="1"/>
+          </p:cNvPicPr>
+          <p:nvPr/>
+        </p:nvPicPr>
+        <p:blipFill>
+          <a:blip r:embed="rId3">
+            <a:extLst>
+              <a:ext uri="{28A0092B-C50C-407E-A947-70E740481C1C}">
+                <a14:useLocalDpi xmlns:a14="http://schemas.microsoft.com/office/drawing/2010/main" val="0"/>
+              </a:ext>
+            </a:extLst>
+          </a:blip>
+          <a:stretch>
+            <a:fillRect/>
+          </a:stretch>
+        </p:blipFill>
+        <p:spPr>
+          <a:xfrm>
+            <a:off x="311700" y="1939058"/>
+            <a:ext cx="4305510" cy="2436098"/>
+          </a:xfrm>
+          <a:prstGeom prst="rect">
+            <a:avLst/>
+          </a:prstGeom>
+        </p:spPr>
+      </p:pic>
+      <p:pic>
+        <p:nvPicPr>
+          <p:cNvPr id="3" name="Picture 2"/>
+          <p:cNvPicPr>
+            <a:picLocks noChangeAspect="1"/>
+          </p:cNvPicPr>
+          <p:nvPr/>
+        </p:nvPicPr>
+        <p:blipFill>
+          <a:blip r:embed="rId4">
+            <a:extLst>
+              <a:ext uri="{28A0092B-C50C-407E-A947-70E740481C1C}">
+                <a14:useLocalDpi xmlns:a14="http://schemas.microsoft.com/office/drawing/2010/main" val="0"/>
+              </a:ext>
+            </a:extLst>
+          </a:blip>
+          <a:stretch>
+            <a:fillRect/>
+          </a:stretch>
+        </p:blipFill>
+        <p:spPr>
+          <a:xfrm>
+            <a:off x="5630834" y="1323329"/>
+            <a:ext cx="2774669" cy="3242767"/>
+          </a:xfrm>
+          <a:prstGeom prst="rect">
+            <a:avLst/>
+          </a:prstGeom>
+        </p:spPr>
+      </p:pic>
+    </p:spTree>
+    <p:extLst>
+      <p:ext uri="{BB962C8B-B14F-4D97-AF65-F5344CB8AC3E}">
+        <p14:creationId xmlns:p14="http://schemas.microsoft.com/office/powerpoint/2010/main" val="996003770"/>
       </p:ext>
     </p:extLst>
   </p:cSld>

</xml_diff>